<commit_message>
Add delete procedure and update jfileloadtree
</commit_message>
<xml_diff>
--- a/db/icon/dev.pptx
+++ b/db/icon/dev.pptx
@@ -12,6 +12,7 @@
     <p:sldId id="260" r:id="rId6"/>
     <p:sldId id="261" r:id="rId7"/>
     <p:sldId id="262" r:id="rId8"/>
+    <p:sldId id="263" r:id="rId9"/>
   </p:sldIdLst>
   <p:sldSz cx="9144000" cy="6858000" type="screen4x3"/>
   <p:notesSz cx="6858000" cy="9144000"/>
@@ -9621,7 +9622,7 @@
             <a:solidFill>
               <a:schemeClr val="tx1"/>
             </a:solidFill>
-            <a:ln>
+            <a:ln w="76200" cmpd="sng">
               <a:noFill/>
             </a:ln>
           </p:spPr>
@@ -9665,7 +9666,7 @@
             <a:solidFill>
               <a:schemeClr val="tx1"/>
             </a:solidFill>
-            <a:ln>
+            <a:ln w="76200" cmpd="sng">
               <a:noFill/>
             </a:ln>
           </p:spPr>
@@ -9709,7 +9710,7 @@
             <a:solidFill>
               <a:schemeClr val="tx1"/>
             </a:solidFill>
-            <a:ln>
+            <a:ln w="76200" cmpd="sng">
               <a:noFill/>
             </a:ln>
           </p:spPr>
@@ -9753,7 +9754,7 @@
             <a:solidFill>
               <a:schemeClr val="tx1"/>
             </a:solidFill>
-            <a:ln>
+            <a:ln w="76200" cmpd="sng">
               <a:noFill/>
             </a:ln>
           </p:spPr>
@@ -9858,7 +9859,7 @@
             <a:solidFill>
               <a:schemeClr val="tx1"/>
             </a:solidFill>
-            <a:ln>
+            <a:ln w="76200" cmpd="sng">
               <a:noFill/>
             </a:ln>
           </p:spPr>
@@ -9902,7 +9903,7 @@
             <a:solidFill>
               <a:schemeClr val="tx1"/>
             </a:solidFill>
-            <a:ln>
+            <a:ln w="76200" cmpd="sng">
               <a:noFill/>
             </a:ln>
           </p:spPr>
@@ -9946,7 +9947,7 @@
             <a:solidFill>
               <a:schemeClr val="tx1"/>
             </a:solidFill>
-            <a:ln>
+            <a:ln w="76200" cmpd="sng">
               <a:noFill/>
             </a:ln>
           </p:spPr>
@@ -9990,7 +9991,7 @@
             <a:solidFill>
               <a:schemeClr val="tx1"/>
             </a:solidFill>
-            <a:ln>
+            <a:ln w="76200" cmpd="sng">
               <a:noFill/>
             </a:ln>
           </p:spPr>
@@ -10081,7 +10082,7 @@
           <a:solidFill>
             <a:schemeClr val="tx1"/>
           </a:solidFill>
-          <a:ln>
+          <a:ln w="76200" cmpd="sng">
             <a:noFill/>
           </a:ln>
         </p:spPr>
@@ -10125,7 +10126,7 @@
           <a:solidFill>
             <a:schemeClr val="tx1"/>
           </a:solidFill>
-          <a:ln>
+          <a:ln w="76200" cmpd="sng">
             <a:noFill/>
           </a:ln>
         </p:spPr>
@@ -10169,7 +10170,7 @@
           <a:solidFill>
             <a:schemeClr val="tx1"/>
           </a:solidFill>
-          <a:ln>
+          <a:ln w="76200" cmpd="sng">
             <a:noFill/>
           </a:ln>
         </p:spPr>
@@ -10213,7 +10214,7 @@
           <a:solidFill>
             <a:schemeClr val="tx1"/>
           </a:solidFill>
-          <a:ln>
+          <a:ln w="76200" cmpd="sng">
             <a:noFill/>
           </a:ln>
         </p:spPr>
@@ -11056,126 +11057,141 @@
           </a:p>
         </p:txBody>
       </p:sp>
-      <p:sp>
-        <p:nvSpPr>
-          <p:cNvPr id="8" name="Rectangle 7"/>
-          <p:cNvSpPr/>
+      <p:grpSp>
+        <p:nvGrpSpPr>
+          <p:cNvPr id="39" name="Group 38"/>
+          <p:cNvGrpSpPr/>
           <p:nvPr/>
-        </p:nvSpPr>
-        <p:spPr>
+        </p:nvGrpSpPr>
+        <p:grpSpPr>
           <a:xfrm>
             <a:off x="7514753" y="3290777"/>
             <a:ext cx="914400" cy="914400"/>
+            <a:chOff x="7514753" y="3290777"/>
+            <a:chExt cx="914400" cy="914400"/>
           </a:xfrm>
-          <a:prstGeom prst="rect">
-            <a:avLst/>
-          </a:prstGeom>
-          <a:noFill/>
-          <a:ln w="76200" cmpd="sng">
-            <a:solidFill>
+        </p:grpSpPr>
+        <p:sp>
+          <p:nvSpPr>
+            <p:cNvPr id="8" name="Rectangle 7"/>
+            <p:cNvSpPr/>
+            <p:nvPr/>
+          </p:nvSpPr>
+          <p:spPr>
+            <a:xfrm>
+              <a:off x="7514753" y="3290777"/>
+              <a:ext cx="914400" cy="914400"/>
+            </a:xfrm>
+            <a:prstGeom prst="rect">
+              <a:avLst/>
+            </a:prstGeom>
+            <a:noFill/>
+            <a:ln w="76200" cmpd="sng">
+              <a:solidFill>
+                <a:schemeClr val="tx1"/>
+              </a:solidFill>
+            </a:ln>
+          </p:spPr>
+          <p:style>
+            <a:lnRef idx="1">
+              <a:schemeClr val="accent1"/>
+            </a:lnRef>
+            <a:fillRef idx="3">
+              <a:schemeClr val="accent1"/>
+            </a:fillRef>
+            <a:effectRef idx="2">
+              <a:schemeClr val="accent1"/>
+            </a:effectRef>
+            <a:fontRef idx="minor">
+              <a:schemeClr val="lt1"/>
+            </a:fontRef>
+          </p:style>
+          <p:txBody>
+            <a:bodyPr rtlCol="0" anchor="ctr"/>
+            <a:lstStyle/>
+            <a:p>
+              <a:pPr algn="ctr"/>
+              <a:endParaRPr lang="en-US"/>
+            </a:p>
+          </p:txBody>
+        </p:sp>
+        <p:cxnSp>
+          <p:nvCxnSpPr>
+            <p:cNvPr id="6" name="Straight Connector 5"/>
+            <p:cNvCxnSpPr>
+              <a:stCxn id="8" idx="0"/>
+              <a:endCxn id="8" idx="2"/>
+            </p:cNvCxnSpPr>
+            <p:nvPr/>
+          </p:nvCxnSpPr>
+          <p:spPr>
+            <a:xfrm>
+              <a:off x="7971953" y="3290777"/>
+              <a:ext cx="0" cy="914400"/>
+            </a:xfrm>
+            <a:prstGeom prst="line">
+              <a:avLst/>
+            </a:prstGeom>
+            <a:ln w="76200" cmpd="sng">
+              <a:solidFill>
+                <a:srgbClr val="000000"/>
+              </a:solidFill>
+            </a:ln>
+          </p:spPr>
+          <p:style>
+            <a:lnRef idx="2">
+              <a:schemeClr val="accent1"/>
+            </a:lnRef>
+            <a:fillRef idx="0">
+              <a:schemeClr val="accent1"/>
+            </a:fillRef>
+            <a:effectRef idx="1">
+              <a:schemeClr val="accent1"/>
+            </a:effectRef>
+            <a:fontRef idx="minor">
               <a:schemeClr val="tx1"/>
-            </a:solidFill>
-          </a:ln>
-        </p:spPr>
-        <p:style>
-          <a:lnRef idx="1">
-            <a:schemeClr val="accent1"/>
-          </a:lnRef>
-          <a:fillRef idx="3">
-            <a:schemeClr val="accent1"/>
-          </a:fillRef>
-          <a:effectRef idx="2">
-            <a:schemeClr val="accent1"/>
-          </a:effectRef>
-          <a:fontRef idx="minor">
-            <a:schemeClr val="lt1"/>
-          </a:fontRef>
-        </p:style>
-        <p:txBody>
-          <a:bodyPr rtlCol="0" anchor="ctr"/>
-          <a:lstStyle/>
-          <a:p>
-            <a:pPr algn="ctr"/>
-            <a:endParaRPr lang="en-US"/>
-          </a:p>
-        </p:txBody>
-      </p:sp>
-      <p:cxnSp>
-        <p:nvCxnSpPr>
-          <p:cNvPr id="6" name="Straight Connector 5"/>
-          <p:cNvCxnSpPr>
-            <a:stCxn id="8" idx="0"/>
-            <a:endCxn id="8" idx="2"/>
-          </p:cNvCxnSpPr>
-          <p:nvPr/>
-        </p:nvCxnSpPr>
-        <p:spPr>
-          <a:xfrm>
-            <a:off x="7971953" y="3290777"/>
-            <a:ext cx="0" cy="914400"/>
-          </a:xfrm>
-          <a:prstGeom prst="line">
-            <a:avLst/>
-          </a:prstGeom>
-          <a:ln w="76200" cmpd="sng">
-            <a:solidFill>
-              <a:srgbClr val="000000"/>
-            </a:solidFill>
-          </a:ln>
-        </p:spPr>
-        <p:style>
-          <a:lnRef idx="2">
-            <a:schemeClr val="accent1"/>
-          </a:lnRef>
-          <a:fillRef idx="0">
-            <a:schemeClr val="accent1"/>
-          </a:fillRef>
-          <a:effectRef idx="1">
-            <a:schemeClr val="accent1"/>
-          </a:effectRef>
-          <a:fontRef idx="minor">
-            <a:schemeClr val="tx1"/>
-          </a:fontRef>
-        </p:style>
-      </p:cxnSp>
-      <p:cxnSp>
-        <p:nvCxnSpPr>
-          <p:cNvPr id="11" name="Straight Connector 10"/>
-          <p:cNvCxnSpPr>
-            <a:stCxn id="8" idx="3"/>
-            <a:endCxn id="8" idx="1"/>
-          </p:cNvCxnSpPr>
-          <p:nvPr/>
-        </p:nvCxnSpPr>
-        <p:spPr>
-          <a:xfrm flipH="1">
-            <a:off x="7514753" y="3747977"/>
-            <a:ext cx="914400" cy="0"/>
-          </a:xfrm>
-          <a:prstGeom prst="line">
-            <a:avLst/>
-          </a:prstGeom>
-          <a:ln w="76200" cmpd="sng">
-            <a:solidFill>
-              <a:srgbClr val="000000"/>
-            </a:solidFill>
-          </a:ln>
-        </p:spPr>
-        <p:style>
-          <a:lnRef idx="2">
-            <a:schemeClr val="accent1"/>
-          </a:lnRef>
-          <a:fillRef idx="0">
-            <a:schemeClr val="accent1"/>
-          </a:fillRef>
-          <a:effectRef idx="1">
-            <a:schemeClr val="accent1"/>
-          </a:effectRef>
-          <a:fontRef idx="minor">
-            <a:schemeClr val="tx1"/>
-          </a:fontRef>
-        </p:style>
-      </p:cxnSp>
+            </a:fontRef>
+          </p:style>
+        </p:cxnSp>
+        <p:cxnSp>
+          <p:nvCxnSpPr>
+            <p:cNvPr id="11" name="Straight Connector 10"/>
+            <p:cNvCxnSpPr>
+              <a:stCxn id="8" idx="3"/>
+              <a:endCxn id="8" idx="1"/>
+            </p:cNvCxnSpPr>
+            <p:nvPr/>
+          </p:nvCxnSpPr>
+          <p:spPr>
+            <a:xfrm flipH="1">
+              <a:off x="7514753" y="3747977"/>
+              <a:ext cx="914400" cy="0"/>
+            </a:xfrm>
+            <a:prstGeom prst="line">
+              <a:avLst/>
+            </a:prstGeom>
+            <a:ln w="76200" cmpd="sng">
+              <a:solidFill>
+                <a:srgbClr val="000000"/>
+              </a:solidFill>
+            </a:ln>
+          </p:spPr>
+          <p:style>
+            <a:lnRef idx="2">
+              <a:schemeClr val="accent1"/>
+            </a:lnRef>
+            <a:fillRef idx="0">
+              <a:schemeClr val="accent1"/>
+            </a:fillRef>
+            <a:effectRef idx="1">
+              <a:schemeClr val="accent1"/>
+            </a:effectRef>
+            <a:fontRef idx="minor">
+              <a:schemeClr val="tx1"/>
+            </a:fontRef>
+          </p:style>
+        </p:cxnSp>
+      </p:grpSp>
       <p:grpSp>
         <p:nvGrpSpPr>
           <p:cNvPr id="29" name="Group 28"/>
@@ -11504,6 +11520,66 @@
           </p:style>
         </p:cxnSp>
       </p:grpSp>
+      <p:pic>
+        <p:nvPicPr>
+          <p:cNvPr id="44" name="Picture 43" descr="184528-200.png"/>
+          <p:cNvPicPr>
+            <a:picLocks noChangeAspect="1"/>
+          </p:cNvPicPr>
+          <p:nvPr/>
+        </p:nvPicPr>
+        <p:blipFill>
+          <a:blip r:embed="rId3">
+            <a:extLst>
+              <a:ext uri="{28A0092B-C50C-407E-A947-70E740481C1C}">
+                <a14:useLocalDpi xmlns:a14="http://schemas.microsoft.com/office/drawing/2010/main" val="0"/>
+              </a:ext>
+            </a:extLst>
+          </a:blip>
+          <a:stretch>
+            <a:fillRect/>
+          </a:stretch>
+        </p:blipFill>
+        <p:spPr>
+          <a:xfrm>
+            <a:off x="1233469" y="3402603"/>
+            <a:ext cx="2540000" cy="2540000"/>
+          </a:xfrm>
+          <a:prstGeom prst="rect">
+            <a:avLst/>
+          </a:prstGeom>
+        </p:spPr>
+      </p:pic>
+      <p:pic>
+        <p:nvPicPr>
+          <p:cNvPr id="45" name="Picture 44" descr="184528-200.png"/>
+          <p:cNvPicPr>
+            <a:picLocks noChangeAspect="1"/>
+          </p:cNvPicPr>
+          <p:nvPr/>
+        </p:nvPicPr>
+        <p:blipFill>
+          <a:blip r:embed="rId3">
+            <a:extLst>
+              <a:ext uri="{28A0092B-C50C-407E-A947-70E740481C1C}">
+                <a14:useLocalDpi xmlns:a14="http://schemas.microsoft.com/office/drawing/2010/main" val="0"/>
+              </a:ext>
+            </a:extLst>
+          </a:blip>
+          <a:stretch>
+            <a:fillRect/>
+          </a:stretch>
+        </p:blipFill>
+        <p:spPr>
+          <a:xfrm flipH="1">
+            <a:off x="3773469" y="107375"/>
+            <a:ext cx="2540000" cy="2540000"/>
+          </a:xfrm>
+          <a:prstGeom prst="rect">
+            <a:avLst/>
+          </a:prstGeom>
+        </p:spPr>
+      </p:pic>
     </p:spTree>
     <p:extLst>
       <p:ext uri="{BB962C8B-B14F-4D97-AF65-F5344CB8AC3E}">
@@ -11521,6 +11597,156 @@
       </p:par>
     </p:tnLst>
   </p:timing>
+</p:sld>
+</file>
+
+<file path=ppt/slides/slide8.xml><?xml version="1.0" encoding="utf-8"?>
+<p:sld xmlns:a="http://schemas.openxmlformats.org/drawingml/2006/main" xmlns:r="http://schemas.openxmlformats.org/officeDocument/2006/relationships" xmlns:p="http://schemas.openxmlformats.org/presentationml/2006/main">
+  <p:cSld>
+    <p:spTree>
+      <p:nvGrpSpPr>
+        <p:cNvPr id="1" name=""/>
+        <p:cNvGrpSpPr/>
+        <p:nvPr/>
+      </p:nvGrpSpPr>
+      <p:grpSpPr>
+        <a:xfrm>
+          <a:off x="0" y="0"/>
+          <a:ext cx="0" cy="0"/>
+          <a:chOff x="0" y="0"/>
+          <a:chExt cx="0" cy="0"/>
+        </a:xfrm>
+      </p:grpSpPr>
+      <p:pic>
+        <p:nvPicPr>
+          <p:cNvPr id="6" name="Picture 5" descr="sagittal.png"/>
+          <p:cNvPicPr>
+            <a:picLocks noChangeAspect="1"/>
+          </p:cNvPicPr>
+          <p:nvPr/>
+        </p:nvPicPr>
+        <p:blipFill>
+          <a:blip r:embed="rId2">
+            <a:extLst>
+              <a:ext uri="{28A0092B-C50C-407E-A947-70E740481C1C}">
+                <a14:useLocalDpi xmlns:a14="http://schemas.microsoft.com/office/drawing/2010/main" val="0"/>
+              </a:ext>
+            </a:extLst>
+          </a:blip>
+          <a:stretch>
+            <a:fillRect/>
+          </a:stretch>
+        </p:blipFill>
+        <p:spPr>
+          <a:xfrm>
+            <a:off x="0" y="0"/>
+            <a:ext cx="2017690" cy="1800000"/>
+          </a:xfrm>
+          <a:prstGeom prst="rect">
+            <a:avLst/>
+          </a:prstGeom>
+        </p:spPr>
+      </p:pic>
+      <p:pic>
+        <p:nvPicPr>
+          <p:cNvPr id="7" name="Picture 6" descr="3d.png"/>
+          <p:cNvPicPr>
+            <a:picLocks noChangeAspect="1"/>
+          </p:cNvPicPr>
+          <p:nvPr/>
+        </p:nvPicPr>
+        <p:blipFill>
+          <a:blip r:embed="rId3">
+            <a:extLst>
+              <a:ext uri="{28A0092B-C50C-407E-A947-70E740481C1C}">
+                <a14:useLocalDpi xmlns:a14="http://schemas.microsoft.com/office/drawing/2010/main" val="0"/>
+              </a:ext>
+            </a:extLst>
+          </a:blip>
+          <a:stretch>
+            <a:fillRect/>
+          </a:stretch>
+        </p:blipFill>
+        <p:spPr>
+          <a:xfrm>
+            <a:off x="6877565" y="1995954"/>
+            <a:ext cx="2017690" cy="1800000"/>
+          </a:xfrm>
+          <a:prstGeom prst="rect">
+            <a:avLst/>
+          </a:prstGeom>
+        </p:spPr>
+      </p:pic>
+      <p:pic>
+        <p:nvPicPr>
+          <p:cNvPr id="8" name="Picture 7" descr="axial.png"/>
+          <p:cNvPicPr>
+            <a:picLocks noChangeAspect="1"/>
+          </p:cNvPicPr>
+          <p:nvPr/>
+        </p:nvPicPr>
+        <p:blipFill>
+          <a:blip r:embed="rId4">
+            <a:extLst>
+              <a:ext uri="{28A0092B-C50C-407E-A947-70E740481C1C}">
+                <a14:useLocalDpi xmlns:a14="http://schemas.microsoft.com/office/drawing/2010/main" val="0"/>
+              </a:ext>
+            </a:extLst>
+          </a:blip>
+          <a:stretch>
+            <a:fillRect/>
+          </a:stretch>
+        </p:blipFill>
+        <p:spPr>
+          <a:xfrm>
+            <a:off x="1187585" y="2895954"/>
+            <a:ext cx="2017690" cy="1800000"/>
+          </a:xfrm>
+          <a:prstGeom prst="rect">
+            <a:avLst/>
+          </a:prstGeom>
+        </p:spPr>
+      </p:pic>
+      <p:pic>
+        <p:nvPicPr>
+          <p:cNvPr id="9" name="Picture 8" descr="coronal.png"/>
+          <p:cNvPicPr>
+            <a:picLocks noChangeAspect="1"/>
+          </p:cNvPicPr>
+          <p:nvPr/>
+        </p:nvPicPr>
+        <p:blipFill>
+          <a:blip r:embed="rId5">
+            <a:extLst>
+              <a:ext uri="{28A0092B-C50C-407E-A947-70E740481C1C}">
+                <a14:useLocalDpi xmlns:a14="http://schemas.microsoft.com/office/drawing/2010/main" val="0"/>
+              </a:ext>
+            </a:extLst>
+          </a:blip>
+          <a:stretch>
+            <a:fillRect/>
+          </a:stretch>
+        </p:blipFill>
+        <p:spPr>
+          <a:xfrm>
+            <a:off x="4353943" y="478369"/>
+            <a:ext cx="2017690" cy="1800000"/>
+          </a:xfrm>
+          <a:prstGeom prst="rect">
+            <a:avLst/>
+          </a:prstGeom>
+        </p:spPr>
+      </p:pic>
+    </p:spTree>
+    <p:extLst>
+      <p:ext uri="{BB962C8B-B14F-4D97-AF65-F5344CB8AC3E}">
+        <p14:creationId xmlns:p14="http://schemas.microsoft.com/office/powerpoint/2010/main" val="3868702380"/>
+      </p:ext>
+    </p:extLst>
+  </p:cSld>
+  <p:clrMapOvr>
+    <a:masterClrMapping/>
+  </p:clrMapOvr>
 </p:sld>
 </file>
 

</xml_diff>

<commit_message>
Make perspective Rotate more reasonable...
Using vector up of the axis
</commit_message>
<xml_diff>
--- a/db/icon/dev.pptx
+++ b/db/icon/dev.pptx
@@ -11737,6 +11737,36 @@
           </a:prstGeom>
         </p:spPr>
       </p:pic>
+      <p:pic>
+        <p:nvPicPr>
+          <p:cNvPr id="11" name="Picture 10" descr="arrow.png"/>
+          <p:cNvPicPr>
+            <a:picLocks noChangeAspect="1"/>
+          </p:cNvPicPr>
+          <p:nvPr/>
+        </p:nvPicPr>
+        <p:blipFill>
+          <a:blip r:embed="rId6">
+            <a:extLst>
+              <a:ext uri="{28A0092B-C50C-407E-A947-70E740481C1C}">
+                <a14:useLocalDpi xmlns:a14="http://schemas.microsoft.com/office/drawing/2010/main" val="0"/>
+              </a:ext>
+            </a:extLst>
+          </a:blip>
+          <a:stretch>
+            <a:fillRect/>
+          </a:stretch>
+        </p:blipFill>
+        <p:spPr>
+          <a:xfrm>
+            <a:off x="5217582" y="3968714"/>
+            <a:ext cx="3856567" cy="2889285"/>
+          </a:xfrm>
+          <a:prstGeom prst="rect">
+            <a:avLst/>
+          </a:prstGeom>
+        </p:spPr>
+      </p:pic>
     </p:spTree>
     <p:extLst>
       <p:ext uri="{BB962C8B-B14F-4D97-AF65-F5344CB8AC3E}">

</xml_diff>